<commit_message>
Added additional data information, weather details
</commit_message>
<xml_diff>
--- a/docs/presentations/eval01/mbta-capstone_eval01.pptx
+++ b/docs/presentations/eval01/mbta-capstone_eval01.pptx
@@ -5,7 +5,7 @@
     <p:sldMasterId id="2147483744" r:id="rId1"/>
   </p:sldMasterIdLst>
   <p:notesMasterIdLst>
-    <p:notesMasterId r:id="rId17"/>
+    <p:notesMasterId r:id="rId19"/>
   </p:notesMasterIdLst>
   <p:sldIdLst>
     <p:sldId id="256" r:id="rId2"/>
@@ -16,13 +16,15 @@
     <p:sldId id="263" r:id="rId7"/>
     <p:sldId id="261" r:id="rId8"/>
     <p:sldId id="264" r:id="rId9"/>
-    <p:sldId id="265" r:id="rId10"/>
-    <p:sldId id="266" r:id="rId11"/>
-    <p:sldId id="268" r:id="rId12"/>
-    <p:sldId id="271" r:id="rId13"/>
-    <p:sldId id="270" r:id="rId14"/>
-    <p:sldId id="272" r:id="rId15"/>
-    <p:sldId id="267" r:id="rId16"/>
+    <p:sldId id="273" r:id="rId10"/>
+    <p:sldId id="265" r:id="rId11"/>
+    <p:sldId id="274" r:id="rId12"/>
+    <p:sldId id="275" r:id="rId13"/>
+    <p:sldId id="268" r:id="rId14"/>
+    <p:sldId id="271" r:id="rId15"/>
+    <p:sldId id="270" r:id="rId16"/>
+    <p:sldId id="272" r:id="rId17"/>
+    <p:sldId id="267" r:id="rId18"/>
   </p:sldIdLst>
   <p:sldSz cx="9144000" cy="6858000" type="screen4x3"/>
   <p:notesSz cx="6858000" cy="9144000"/>
@@ -16302,7 +16304,6 @@
               <a:rPr lang="en-US" sz="1400" dirty="0"/>
               <a:t>&gt;</a:t>
             </a:r>
-            <a:endParaRPr lang="en-US" sz="1400" dirty="0"/>
           </a:p>
         </p:txBody>
       </p:sp>
@@ -16575,7 +16576,7 @@
           <a:p>
             <a:r>
               <a:rPr lang="en-US" dirty="0" smtClean="0"/>
-              <a:t>Weather Data</a:t>
+              <a:t>Transportation Data</a:t>
             </a:r>
             <a:endParaRPr lang="en-US" dirty="0"/>
           </a:p>
@@ -16583,7 +16584,7 @@
       </p:sp>
       <p:pic>
         <p:nvPicPr>
-          <p:cNvPr id="2" name="Picture 1"/>
+          <p:cNvPr id="7" name="Picture 6" descr="transport_data.png"/>
           <p:cNvPicPr>
             <a:picLocks noChangeAspect="1"/>
           </p:cNvPicPr>
@@ -16603,8 +16604,8 @@
         </p:blipFill>
         <p:spPr>
           <a:xfrm>
-            <a:off x="174994" y="3455968"/>
-            <a:ext cx="8686800" cy="1138468"/>
+            <a:off x="1607617" y="3672390"/>
+            <a:ext cx="5956491" cy="1604380"/>
           </a:xfrm>
           <a:prstGeom prst="rect">
             <a:avLst/>
@@ -16614,7 +16615,7 @@
     </p:spTree>
     <p:extLst>
       <p:ext uri="{BB962C8B-B14F-4D97-AF65-F5344CB8AC3E}">
-        <p14:creationId xmlns:p14="http://schemas.microsoft.com/office/powerpoint/2010/main" val="2402317428"/>
+        <p14:creationId xmlns:p14="http://schemas.microsoft.com/office/powerpoint/2010/main" val="3960661855"/>
       </p:ext>
     </p:extLst>
   </p:cSld>
@@ -16665,18 +16666,57 @@
           </a:bodyPr>
           <a:lstStyle/>
           <a:p>
-            <a:pPr marL="0" indent="0" algn="ctr">
-              <a:buNone/>
-            </a:pPr>
             <a:r>
-              <a:rPr lang="en-US" sz="3600" i="1" dirty="0" err="1" smtClean="0"/>
-              <a:t>Ipython</a:t>
+              <a:rPr lang="en-US" dirty="0"/>
+              <a:t>Obvious question: how does weather affect </a:t>
             </a:r>
             <a:r>
-              <a:rPr lang="en-US" sz="3600" i="1" dirty="0" smtClean="0"/>
-              <a:t> notebook 1…</a:t>
+              <a:rPr lang="en-US" dirty="0" smtClean="0"/>
+              <a:t>demand?</a:t>
             </a:r>
-            <a:endParaRPr lang="en-US" sz="3600" i="1" dirty="0"/>
+          </a:p>
+          <a:p>
+            <a:r>
+              <a:rPr lang="en-US" dirty="0" smtClean="0"/>
+              <a:t>Daily weather history</a:t>
+            </a:r>
+          </a:p>
+          <a:p>
+            <a:r>
+              <a:rPr lang="en-US" dirty="0" smtClean="0"/>
+              <a:t>Typical daily weather for comparison</a:t>
+            </a:r>
+          </a:p>
+          <a:p>
+            <a:endParaRPr lang="en-US" dirty="0"/>
+          </a:p>
+          <a:p>
+            <a:r>
+              <a:rPr lang="en-US" dirty="0" smtClean="0"/>
+              <a:t>Sources:</a:t>
+            </a:r>
+          </a:p>
+          <a:p>
+            <a:pPr lvl="1"/>
+            <a:r>
+              <a:rPr lang="en-US" dirty="0" smtClean="0"/>
+              <a:t>NOAA</a:t>
+            </a:r>
+            <a:r>
+              <a:rPr lang="en-US" dirty="0"/>
+              <a:t> </a:t>
+            </a:r>
+            <a:r>
+              <a:rPr lang="en-US" dirty="0" smtClean="0"/>
+              <a:t>and affiliates (NWS, NCDC)</a:t>
+            </a:r>
+          </a:p>
+          <a:p>
+            <a:pPr lvl="1"/>
+            <a:r>
+              <a:rPr lang="en-US" dirty="0" smtClean="0"/>
+              <a:t>Weather Underground</a:t>
+            </a:r>
           </a:p>
         </p:txBody>
       </p:sp>
@@ -16697,7 +16737,7 @@
           <a:p>
             <a:r>
               <a:rPr lang="en-US" dirty="0" smtClean="0"/>
-              <a:t>Exploration</a:t>
+              <a:t>Weather Data</a:t>
             </a:r>
             <a:endParaRPr lang="en-US" dirty="0"/>
           </a:p>
@@ -16706,20 +16746,13 @@
     </p:spTree>
     <p:extLst>
       <p:ext uri="{BB962C8B-B14F-4D97-AF65-F5344CB8AC3E}">
-        <p14:creationId xmlns:p14="http://schemas.microsoft.com/office/powerpoint/2010/main" val="1536667316"/>
+        <p14:creationId xmlns:p14="http://schemas.microsoft.com/office/powerpoint/2010/main" val="1651133500"/>
       </p:ext>
     </p:extLst>
   </p:cSld>
   <p:clrMapOvr>
     <a:masterClrMapping/>
   </p:clrMapOvr>
-  <p:timing>
-    <p:tnLst>
-      <p:par>
-        <p:cTn xmlns:p14="http://schemas.microsoft.com/office/powerpoint/2010/main" id="1" dur="indefinite" restart="never" nodeType="tmRoot"/>
-      </p:par>
-    </p:tnLst>
-  </p:timing>
 </p:sld>
 </file>
 
@@ -16752,6 +16785,199 @@
         </p:nvSpPr>
         <p:spPr/>
         <p:txBody>
+          <a:bodyPr/>
+          <a:lstStyle/>
+          <a:p>
+            <a:r>
+              <a:rPr lang="en-US" dirty="0" smtClean="0"/>
+              <a:t>Temperatures (low / high / average)</a:t>
+            </a:r>
+          </a:p>
+          <a:p>
+            <a:r>
+              <a:rPr lang="en-US" dirty="0" smtClean="0"/>
+              <a:t>Snowfall and precipitation</a:t>
+            </a:r>
+          </a:p>
+          <a:p>
+            <a:pPr lvl="1"/>
+            <a:r>
+              <a:rPr lang="en-US" dirty="0" smtClean="0"/>
+              <a:t>Typical snow depth</a:t>
+            </a:r>
+          </a:p>
+          <a:p>
+            <a:r>
+              <a:rPr lang="en-US" dirty="0" smtClean="0"/>
+              <a:t>Other weather events: hail, fog</a:t>
+            </a:r>
+          </a:p>
+          <a:p>
+            <a:r>
+              <a:rPr lang="en-US" dirty="0" smtClean="0"/>
+              <a:t>Miscellanea: wind speed, visibility</a:t>
+            </a:r>
+            <a:endParaRPr lang="en-US" dirty="0"/>
+          </a:p>
+        </p:txBody>
+      </p:sp>
+      <p:sp>
+        <p:nvSpPr>
+          <p:cNvPr id="3" name="Title 2"/>
+          <p:cNvSpPr>
+            <a:spLocks noGrp="1"/>
+          </p:cNvSpPr>
+          <p:nvPr>
+            <p:ph type="title"/>
+          </p:nvPr>
+        </p:nvSpPr>
+        <p:spPr/>
+        <p:txBody>
+          <a:bodyPr/>
+          <a:lstStyle/>
+          <a:p>
+            <a:r>
+              <a:rPr lang="en-US" dirty="0" smtClean="0"/>
+              <a:t>Weather Data</a:t>
+            </a:r>
+            <a:endParaRPr lang="en-US" dirty="0"/>
+          </a:p>
+        </p:txBody>
+      </p:sp>
+    </p:spTree>
+    <p:extLst>
+      <p:ext uri="{BB962C8B-B14F-4D97-AF65-F5344CB8AC3E}">
+        <p14:creationId xmlns:p14="http://schemas.microsoft.com/office/powerpoint/2010/main" val="581323902"/>
+      </p:ext>
+    </p:extLst>
+  </p:cSld>
+  <p:clrMapOvr>
+    <a:masterClrMapping/>
+  </p:clrMapOvr>
+</p:sld>
+</file>
+
+<file path=ppt/slides/slide13.xml><?xml version="1.0" encoding="utf-8"?>
+<p:sld xmlns:a="http://schemas.openxmlformats.org/drawingml/2006/main" xmlns:r="http://schemas.openxmlformats.org/officeDocument/2006/relationships" xmlns:p="http://schemas.openxmlformats.org/presentationml/2006/main">
+  <p:cSld>
+    <p:spTree>
+      <p:nvGrpSpPr>
+        <p:cNvPr id="1" name=""/>
+        <p:cNvGrpSpPr/>
+        <p:nvPr/>
+      </p:nvGrpSpPr>
+      <p:grpSpPr>
+        <a:xfrm>
+          <a:off x="0" y="0"/>
+          <a:ext cx="0" cy="0"/>
+          <a:chOff x="0" y="0"/>
+          <a:chExt cx="0" cy="0"/>
+        </a:xfrm>
+      </p:grpSpPr>
+      <p:sp>
+        <p:nvSpPr>
+          <p:cNvPr id="2" name="Content Placeholder 1"/>
+          <p:cNvSpPr>
+            <a:spLocks noGrp="1"/>
+          </p:cNvSpPr>
+          <p:nvPr>
+            <p:ph idx="1"/>
+          </p:nvPr>
+        </p:nvSpPr>
+        <p:spPr/>
+        <p:txBody>
+          <a:bodyPr>
+            <a:normAutofit/>
+          </a:bodyPr>
+          <a:lstStyle/>
+          <a:p>
+            <a:pPr marL="0" indent="0" algn="ctr">
+              <a:buNone/>
+            </a:pPr>
+            <a:r>
+              <a:rPr lang="en-US" sz="3600" i="1" dirty="0" err="1" smtClean="0"/>
+              <a:t>Ipython</a:t>
+            </a:r>
+            <a:r>
+              <a:rPr lang="en-US" sz="3600" i="1" dirty="0" smtClean="0"/>
+              <a:t> notebook 1…</a:t>
+            </a:r>
+            <a:endParaRPr lang="en-US" sz="3600" i="1" dirty="0"/>
+          </a:p>
+        </p:txBody>
+      </p:sp>
+      <p:sp>
+        <p:nvSpPr>
+          <p:cNvPr id="3" name="Title 2"/>
+          <p:cNvSpPr>
+            <a:spLocks noGrp="1"/>
+          </p:cNvSpPr>
+          <p:nvPr>
+            <p:ph type="title"/>
+          </p:nvPr>
+        </p:nvSpPr>
+        <p:spPr/>
+        <p:txBody>
+          <a:bodyPr/>
+          <a:lstStyle/>
+          <a:p>
+            <a:r>
+              <a:rPr lang="en-US" dirty="0" smtClean="0"/>
+              <a:t>Exploration</a:t>
+            </a:r>
+            <a:endParaRPr lang="en-US" dirty="0"/>
+          </a:p>
+        </p:txBody>
+      </p:sp>
+    </p:spTree>
+    <p:extLst>
+      <p:ext uri="{BB962C8B-B14F-4D97-AF65-F5344CB8AC3E}">
+        <p14:creationId xmlns:p14="http://schemas.microsoft.com/office/powerpoint/2010/main" val="1536667316"/>
+      </p:ext>
+    </p:extLst>
+  </p:cSld>
+  <p:clrMapOvr>
+    <a:masterClrMapping/>
+  </p:clrMapOvr>
+  <p:timing>
+    <p:tnLst>
+      <p:par>
+        <p:cTn xmlns:p14="http://schemas.microsoft.com/office/powerpoint/2010/main" id="1" dur="indefinite" restart="never" nodeType="tmRoot"/>
+      </p:par>
+    </p:tnLst>
+  </p:timing>
+</p:sld>
+</file>
+
+<file path=ppt/slides/slide14.xml><?xml version="1.0" encoding="utf-8"?>
+<p:sld xmlns:a="http://schemas.openxmlformats.org/drawingml/2006/main" xmlns:r="http://schemas.openxmlformats.org/officeDocument/2006/relationships" xmlns:p="http://schemas.openxmlformats.org/presentationml/2006/main">
+  <p:cSld>
+    <p:spTree>
+      <p:nvGrpSpPr>
+        <p:cNvPr id="1" name=""/>
+        <p:cNvGrpSpPr/>
+        <p:nvPr/>
+      </p:nvGrpSpPr>
+      <p:grpSpPr>
+        <a:xfrm>
+          <a:off x="0" y="0"/>
+          <a:ext cx="0" cy="0"/>
+          <a:chOff x="0" y="0"/>
+          <a:chExt cx="0" cy="0"/>
+        </a:xfrm>
+      </p:grpSpPr>
+      <p:sp>
+        <p:nvSpPr>
+          <p:cNvPr id="2" name="Content Placeholder 1"/>
+          <p:cNvSpPr>
+            <a:spLocks noGrp="1"/>
+          </p:cNvSpPr>
+          <p:nvPr>
+            <p:ph idx="1"/>
+          </p:nvPr>
+        </p:nvSpPr>
+        <p:spPr/>
+        <p:txBody>
           <a:bodyPr>
             <a:normAutofit/>
           </a:bodyPr>
@@ -16815,7 +17041,7 @@
 </p:sld>
 </file>
 
-<file path=ppt/slides/slide13.xml><?xml version="1.0" encoding="utf-8"?>
+<file path=ppt/slides/slide15.xml><?xml version="1.0" encoding="utf-8"?>
 <p:sld xmlns:a="http://schemas.openxmlformats.org/drawingml/2006/main" xmlns:r="http://schemas.openxmlformats.org/officeDocument/2006/relationships" xmlns:p="http://schemas.openxmlformats.org/presentationml/2006/main">
   <p:cSld>
     <p:spTree>
@@ -16935,7 +17161,7 @@
 </p:sld>
 </file>
 
-<file path=ppt/slides/slide14.xml><?xml version="1.0" encoding="utf-8"?>
+<file path=ppt/slides/slide16.xml><?xml version="1.0" encoding="utf-8"?>
 <p:sld xmlns:a="http://schemas.openxmlformats.org/drawingml/2006/main" xmlns:r="http://schemas.openxmlformats.org/officeDocument/2006/relationships" xmlns:p="http://schemas.openxmlformats.org/presentationml/2006/main">
   <p:cSld>
     <p:spTree>
@@ -16987,7 +17213,20 @@
           <a:p>
             <a:r>
               <a:rPr lang="en-US" dirty="0" smtClean="0"/>
-              <a:t>Sentiment Analysis</a:t>
+              <a:t>Sentiment </a:t>
+            </a:r>
+            <a:r>
+              <a:rPr lang="en-US" dirty="0" smtClean="0"/>
+              <a:t>Analysis</a:t>
+            </a:r>
+          </a:p>
+          <a:p>
+            <a:endParaRPr lang="en-US" dirty="0"/>
+          </a:p>
+          <a:p>
+            <a:r>
+              <a:rPr lang="en-US" dirty="0" smtClean="0"/>
+              <a:t>MBTA Alerts</a:t>
             </a:r>
             <a:endParaRPr lang="en-US" dirty="0"/>
           </a:p>
@@ -17066,7 +17305,7 @@
 </p:sld>
 </file>
 
-<file path=ppt/slides/slide15.xml><?xml version="1.0" encoding="utf-8"?>
+<file path=ppt/slides/slide17.xml><?xml version="1.0" encoding="utf-8"?>
 <p:sld xmlns:a="http://schemas.openxmlformats.org/drawingml/2006/main" xmlns:r="http://schemas.openxmlformats.org/officeDocument/2006/relationships" xmlns:p="http://schemas.openxmlformats.org/presentationml/2006/main">
   <p:cSld>
     <p:spTree>
@@ -19731,6 +19970,65 @@
       </p:grpSpPr>
       <p:sp>
         <p:nvSpPr>
+          <p:cNvPr id="2" name="Content Placeholder 1"/>
+          <p:cNvSpPr>
+            <a:spLocks noGrp="1"/>
+          </p:cNvSpPr>
+          <p:nvPr>
+            <p:ph idx="1"/>
+          </p:nvPr>
+        </p:nvSpPr>
+        <p:spPr/>
+        <p:txBody>
+          <a:bodyPr>
+            <a:normAutofit/>
+          </a:bodyPr>
+          <a:lstStyle/>
+          <a:p>
+            <a:r>
+              <a:rPr lang="en-US" dirty="0" smtClean="0"/>
+              <a:t>January, 2014 – February, 2015</a:t>
+            </a:r>
+          </a:p>
+          <a:p>
+            <a:r>
+              <a:rPr lang="en-US" dirty="0" smtClean="0"/>
+              <a:t>7.83 million records</a:t>
+            </a:r>
+          </a:p>
+          <a:p>
+            <a:r>
+              <a:rPr lang="en-US" dirty="0" smtClean="0"/>
+              <a:t>286 million rides (~1.3 million per weekday)</a:t>
+            </a:r>
+          </a:p>
+          <a:p>
+            <a:endParaRPr lang="en-US" dirty="0" smtClean="0"/>
+          </a:p>
+          <a:p>
+            <a:r>
+              <a:rPr lang="en-US" dirty="0" smtClean="0"/>
+              <a:t>Aggregation:</a:t>
+            </a:r>
+          </a:p>
+          <a:p>
+            <a:pPr lvl="1"/>
+            <a:r>
+              <a:rPr lang="en-US" dirty="0" smtClean="0"/>
+              <a:t>Bus route/direction and T location</a:t>
+            </a:r>
+          </a:p>
+          <a:p>
+            <a:pPr lvl="1"/>
+            <a:r>
+              <a:rPr lang="en-US" dirty="0" smtClean="0"/>
+              <a:t>15-minute increments</a:t>
+            </a:r>
+          </a:p>
+        </p:txBody>
+      </p:sp>
+      <p:sp>
+        <p:nvSpPr>
           <p:cNvPr id="3" name="Title 2"/>
           <p:cNvSpPr>
             <a:spLocks noGrp="1"/>
@@ -19752,40 +20050,10 @@
           </a:p>
         </p:txBody>
       </p:sp>
-      <p:pic>
-        <p:nvPicPr>
-          <p:cNvPr id="7" name="Picture 6" descr="transport_data.png"/>
-          <p:cNvPicPr>
-            <a:picLocks noChangeAspect="1"/>
-          </p:cNvPicPr>
-          <p:nvPr/>
-        </p:nvPicPr>
-        <p:blipFill>
-          <a:blip r:embed="rId3">
-            <a:extLst>
-              <a:ext uri="{28A0092B-C50C-407E-A947-70E740481C1C}">
-                <a14:useLocalDpi xmlns:a14="http://schemas.microsoft.com/office/drawing/2010/main" val="0"/>
-              </a:ext>
-            </a:extLst>
-          </a:blip>
-          <a:stretch>
-            <a:fillRect/>
-          </a:stretch>
-        </p:blipFill>
-        <p:spPr>
-          <a:xfrm>
-            <a:off x="1607617" y="3672390"/>
-            <a:ext cx="5956491" cy="1604380"/>
-          </a:xfrm>
-          <a:prstGeom prst="rect">
-            <a:avLst/>
-          </a:prstGeom>
-        </p:spPr>
-      </p:pic>
     </p:spTree>
     <p:extLst>
       <p:ext uri="{BB962C8B-B14F-4D97-AF65-F5344CB8AC3E}">
-        <p14:creationId xmlns:p14="http://schemas.microsoft.com/office/powerpoint/2010/main" val="3960661855"/>
+        <p14:creationId xmlns:p14="http://schemas.microsoft.com/office/powerpoint/2010/main" val="2646175456"/>
       </p:ext>
     </p:extLst>
   </p:cSld>

</xml_diff>